<commit_message>
Further changes in the document.
</commit_message>
<xml_diff>
--- a/doc/tex/lib/homodyne_receiver/figures_raw/MQAM_receiver_block_diagram.pptx
+++ b/doc/tex/lib/homodyne_receiver/figures_raw/MQAM_receiver_block_diagram.pptx
@@ -263,7 +263,7 @@
           <a:p>
             <a:fld id="{1FB34746-79CB-4371-B89F-4BC9AAAE441B}" type="datetimeFigureOut">
               <a:rPr lang="pt-PT" smtClean="0"/>
-              <a:t>26-12-2017</a:t>
+              <a:t>06/02/2018</a:t>
             </a:fld>
             <a:endParaRPr lang="pt-PT"/>
           </a:p>
@@ -317,7 +317,7 @@
           <a:p>
             <a:fld id="{DF1F7569-716B-49EE-A971-18C62E497BE6}" type="slidenum">
               <a:rPr lang="pt-PT" smtClean="0"/>
-              <a:t>‹nº›</a:t>
+              <a:t>‹#›</a:t>
             </a:fld>
             <a:endParaRPr lang="pt-PT"/>
           </a:p>
@@ -461,7 +461,7 @@
           <a:p>
             <a:fld id="{1FB34746-79CB-4371-B89F-4BC9AAAE441B}" type="datetimeFigureOut">
               <a:rPr lang="pt-PT" smtClean="0"/>
-              <a:t>26-12-2017</a:t>
+              <a:t>06/02/2018</a:t>
             </a:fld>
             <a:endParaRPr lang="pt-PT"/>
           </a:p>
@@ -515,7 +515,7 @@
           <a:p>
             <a:fld id="{DF1F7569-716B-49EE-A971-18C62E497BE6}" type="slidenum">
               <a:rPr lang="pt-PT" smtClean="0"/>
-              <a:t>‹nº›</a:t>
+              <a:t>‹#›</a:t>
             </a:fld>
             <a:endParaRPr lang="pt-PT"/>
           </a:p>
@@ -669,7 +669,7 @@
           <a:p>
             <a:fld id="{1FB34746-79CB-4371-B89F-4BC9AAAE441B}" type="datetimeFigureOut">
               <a:rPr lang="pt-PT" smtClean="0"/>
-              <a:t>26-12-2017</a:t>
+              <a:t>06/02/2018</a:t>
             </a:fld>
             <a:endParaRPr lang="pt-PT"/>
           </a:p>
@@ -723,7 +723,7 @@
           <a:p>
             <a:fld id="{DF1F7569-716B-49EE-A971-18C62E497BE6}" type="slidenum">
               <a:rPr lang="pt-PT" smtClean="0"/>
-              <a:t>‹nº›</a:t>
+              <a:t>‹#›</a:t>
             </a:fld>
             <a:endParaRPr lang="pt-PT"/>
           </a:p>
@@ -867,7 +867,7 @@
           <a:p>
             <a:fld id="{1FB34746-79CB-4371-B89F-4BC9AAAE441B}" type="datetimeFigureOut">
               <a:rPr lang="pt-PT" smtClean="0"/>
-              <a:t>26-12-2017</a:t>
+              <a:t>06/02/2018</a:t>
             </a:fld>
             <a:endParaRPr lang="pt-PT"/>
           </a:p>
@@ -921,7 +921,7 @@
           <a:p>
             <a:fld id="{DF1F7569-716B-49EE-A971-18C62E497BE6}" type="slidenum">
               <a:rPr lang="pt-PT" smtClean="0"/>
-              <a:t>‹nº›</a:t>
+              <a:t>‹#›</a:t>
             </a:fld>
             <a:endParaRPr lang="pt-PT"/>
           </a:p>
@@ -1142,7 +1142,7 @@
           <a:p>
             <a:fld id="{1FB34746-79CB-4371-B89F-4BC9AAAE441B}" type="datetimeFigureOut">
               <a:rPr lang="pt-PT" smtClean="0"/>
-              <a:t>26-12-2017</a:t>
+              <a:t>06/02/2018</a:t>
             </a:fld>
             <a:endParaRPr lang="pt-PT"/>
           </a:p>
@@ -1196,7 +1196,7 @@
           <a:p>
             <a:fld id="{DF1F7569-716B-49EE-A971-18C62E497BE6}" type="slidenum">
               <a:rPr lang="pt-PT" smtClean="0"/>
-              <a:t>‹nº›</a:t>
+              <a:t>‹#›</a:t>
             </a:fld>
             <a:endParaRPr lang="pt-PT"/>
           </a:p>
@@ -1407,7 +1407,7 @@
           <a:p>
             <a:fld id="{1FB34746-79CB-4371-B89F-4BC9AAAE441B}" type="datetimeFigureOut">
               <a:rPr lang="pt-PT" smtClean="0"/>
-              <a:t>26-12-2017</a:t>
+              <a:t>06/02/2018</a:t>
             </a:fld>
             <a:endParaRPr lang="pt-PT"/>
           </a:p>
@@ -1461,7 +1461,7 @@
           <a:p>
             <a:fld id="{DF1F7569-716B-49EE-A971-18C62E497BE6}" type="slidenum">
               <a:rPr lang="pt-PT" smtClean="0"/>
-              <a:t>‹nº›</a:t>
+              <a:t>‹#›</a:t>
             </a:fld>
             <a:endParaRPr lang="pt-PT"/>
           </a:p>
@@ -1819,7 +1819,7 @@
           <a:p>
             <a:fld id="{1FB34746-79CB-4371-B89F-4BC9AAAE441B}" type="datetimeFigureOut">
               <a:rPr lang="pt-PT" smtClean="0"/>
-              <a:t>26-12-2017</a:t>
+              <a:t>06/02/2018</a:t>
             </a:fld>
             <a:endParaRPr lang="pt-PT"/>
           </a:p>
@@ -1873,7 +1873,7 @@
           <a:p>
             <a:fld id="{DF1F7569-716B-49EE-A971-18C62E497BE6}" type="slidenum">
               <a:rPr lang="pt-PT" smtClean="0"/>
-              <a:t>‹nº›</a:t>
+              <a:t>‹#›</a:t>
             </a:fld>
             <a:endParaRPr lang="pt-PT"/>
           </a:p>
@@ -1960,7 +1960,7 @@
           <a:p>
             <a:fld id="{1FB34746-79CB-4371-B89F-4BC9AAAE441B}" type="datetimeFigureOut">
               <a:rPr lang="pt-PT" smtClean="0"/>
-              <a:t>26-12-2017</a:t>
+              <a:t>06/02/2018</a:t>
             </a:fld>
             <a:endParaRPr lang="pt-PT"/>
           </a:p>
@@ -2014,7 +2014,7 @@
           <a:p>
             <a:fld id="{DF1F7569-716B-49EE-A971-18C62E497BE6}" type="slidenum">
               <a:rPr lang="pt-PT" smtClean="0"/>
-              <a:t>‹nº›</a:t>
+              <a:t>‹#›</a:t>
             </a:fld>
             <a:endParaRPr lang="pt-PT"/>
           </a:p>
@@ -2073,7 +2073,7 @@
           <a:p>
             <a:fld id="{1FB34746-79CB-4371-B89F-4BC9AAAE441B}" type="datetimeFigureOut">
               <a:rPr lang="pt-PT" smtClean="0"/>
-              <a:t>26-12-2017</a:t>
+              <a:t>06/02/2018</a:t>
             </a:fld>
             <a:endParaRPr lang="pt-PT"/>
           </a:p>
@@ -2127,7 +2127,7 @@
           <a:p>
             <a:fld id="{DF1F7569-716B-49EE-A971-18C62E497BE6}" type="slidenum">
               <a:rPr lang="pt-PT" smtClean="0"/>
-              <a:t>‹nº›</a:t>
+              <a:t>‹#›</a:t>
             </a:fld>
             <a:endParaRPr lang="pt-PT"/>
           </a:p>
@@ -2384,7 +2384,7 @@
           <a:p>
             <a:fld id="{1FB34746-79CB-4371-B89F-4BC9AAAE441B}" type="datetimeFigureOut">
               <a:rPr lang="pt-PT" smtClean="0"/>
-              <a:t>26-12-2017</a:t>
+              <a:t>06/02/2018</a:t>
             </a:fld>
             <a:endParaRPr lang="pt-PT"/>
           </a:p>
@@ -2438,7 +2438,7 @@
           <a:p>
             <a:fld id="{DF1F7569-716B-49EE-A971-18C62E497BE6}" type="slidenum">
               <a:rPr lang="pt-PT" smtClean="0"/>
-              <a:t>‹nº›</a:t>
+              <a:t>‹#›</a:t>
             </a:fld>
             <a:endParaRPr lang="pt-PT"/>
           </a:p>
@@ -2672,7 +2672,7 @@
           <a:p>
             <a:fld id="{1FB34746-79CB-4371-B89F-4BC9AAAE441B}" type="datetimeFigureOut">
               <a:rPr lang="pt-PT" smtClean="0"/>
-              <a:t>26-12-2017</a:t>
+              <a:t>06/02/2018</a:t>
             </a:fld>
             <a:endParaRPr lang="pt-PT"/>
           </a:p>
@@ -2726,7 +2726,7 @@
           <a:p>
             <a:fld id="{DF1F7569-716B-49EE-A971-18C62E497BE6}" type="slidenum">
               <a:rPr lang="pt-PT" smtClean="0"/>
-              <a:t>‹nº›</a:t>
+              <a:t>‹#›</a:t>
             </a:fld>
             <a:endParaRPr lang="pt-PT"/>
           </a:p>
@@ -2913,7 +2913,7 @@
           <a:p>
             <a:fld id="{1FB34746-79CB-4371-B89F-4BC9AAAE441B}" type="datetimeFigureOut">
               <a:rPr lang="pt-PT" smtClean="0"/>
-              <a:t>26-12-2017</a:t>
+              <a:t>06/02/2018</a:t>
             </a:fld>
             <a:endParaRPr lang="pt-PT"/>
           </a:p>
@@ -3003,7 +3003,7 @@
           <a:p>
             <a:fld id="{DF1F7569-716B-49EE-A971-18C62E497BE6}" type="slidenum">
               <a:rPr lang="pt-PT" smtClean="0"/>
-              <a:t>‹nº›</a:t>
+              <a:t>‹#›</a:t>
             </a:fld>
             <a:endParaRPr lang="pt-PT"/>
           </a:p>
@@ -4120,20 +4120,12 @@
               <a:p>
                 <a:pPr algn="ctr"/>
                 <a:r>
-                  <a:rPr lang="pt-PT" dirty="0">
+                  <a:rPr lang="pt-PT" dirty="0" smtClean="0">
                     <a:solidFill>
                       <a:schemeClr val="tx1"/>
                     </a:solidFill>
                   </a:rPr>
-                  <a:t>Pulse </a:t>
-                </a:r>
-                <a:r>
-                  <a:rPr lang="pt-PT" dirty="0" err="1">
-                    <a:solidFill>
-                      <a:schemeClr val="tx1"/>
-                    </a:solidFill>
-                  </a:rPr>
-                  <a:t>Shaper</a:t>
+                  <a:t>Electrical Filter</a:t>
                 </a:r>
                 <a:endParaRPr lang="pt-PT" dirty="0">
                   <a:solidFill>
@@ -4192,20 +4184,12 @@
               <a:p>
                 <a:pPr algn="ctr"/>
                 <a:r>
-                  <a:rPr lang="pt-PT" dirty="0">
+                  <a:rPr lang="pt-PT" dirty="0" smtClean="0">
                     <a:solidFill>
                       <a:schemeClr val="tx1"/>
                     </a:solidFill>
                   </a:rPr>
-                  <a:t>Pulse </a:t>
-                </a:r>
-                <a:r>
-                  <a:rPr lang="pt-PT" dirty="0" err="1">
-                    <a:solidFill>
-                      <a:schemeClr val="tx1"/>
-                    </a:solidFill>
-                  </a:rPr>
-                  <a:t>Shaper</a:t>
+                  <a:t>Electrical Filter</a:t>
                 </a:r>
                 <a:endParaRPr lang="pt-PT" dirty="0">
                   <a:solidFill>

</xml_diff>